<commit_message>
Slides 00_Installation_introduction: Versuch meine slides an den bereits vorhanden style anzupassen und klaeglich gescheitert, 2 neue Slides zum erzeugen ssh key, da die erzeugung bei win,mac, linux sich nicht unterscheidet und wo der PubKey herkommt
</commit_message>
<xml_diff>
--- a/slides/00_installation_introduction.pptx
+++ b/slides/00_installation_introduction.pptx
@@ -5,24 +5,25 @@
     <p:sldMasterId id="2147483662" r:id="rId1"/>
   </p:sldMasterIdLst>
   <p:notesMasterIdLst>
-    <p:notesMasterId r:id="rId17"/>
+    <p:notesMasterId r:id="rId18"/>
   </p:notesMasterIdLst>
   <p:sldIdLst>
     <p:sldId id="256" r:id="rId2"/>
     <p:sldId id="257" r:id="rId3"/>
     <p:sldId id="258" r:id="rId4"/>
     <p:sldId id="259" r:id="rId5"/>
-    <p:sldId id="269" r:id="rId6"/>
-    <p:sldId id="270" r:id="rId7"/>
-    <p:sldId id="260" r:id="rId8"/>
-    <p:sldId id="261" r:id="rId9"/>
-    <p:sldId id="262" r:id="rId10"/>
-    <p:sldId id="263" r:id="rId11"/>
-    <p:sldId id="264" r:id="rId12"/>
-    <p:sldId id="265" r:id="rId13"/>
-    <p:sldId id="266" r:id="rId14"/>
-    <p:sldId id="267" r:id="rId15"/>
-    <p:sldId id="268" r:id="rId16"/>
+    <p:sldId id="270" r:id="rId6"/>
+    <p:sldId id="260" r:id="rId7"/>
+    <p:sldId id="261" r:id="rId8"/>
+    <p:sldId id="262" r:id="rId9"/>
+    <p:sldId id="271" r:id="rId10"/>
+    <p:sldId id="272" r:id="rId11"/>
+    <p:sldId id="263" r:id="rId12"/>
+    <p:sldId id="264" r:id="rId13"/>
+    <p:sldId id="265" r:id="rId14"/>
+    <p:sldId id="266" r:id="rId15"/>
+    <p:sldId id="267" r:id="rId16"/>
+    <p:sldId id="268" r:id="rId17"/>
   </p:sldIdLst>
   <p:sldSz cx="9144000" cy="5143500" type="screen16x9"/>
   <p:notesSz cx="6858000" cy="9144000"/>
@@ -2045,7 +2046,7 @@
         </p:nvSpPr>
         <p:spPr>
           <a:xfrm>
-            <a:off x="381300" y="685800"/>
+            <a:off x="381000" y="685800"/>
             <a:ext cx="6096000" cy="3429000"/>
           </a:xfrm>
           <a:custGeom>
@@ -2167,7 +2168,7 @@
         </p:nvSpPr>
         <p:spPr>
           <a:xfrm>
-            <a:off x="381300" y="685800"/>
+            <a:off x="381000" y="685800"/>
             <a:ext cx="6096000" cy="3429000"/>
           </a:xfrm>
           <a:custGeom>
@@ -10396,6 +10397,98 @@
   <p:cSld>
     <p:spTree>
       <p:nvGrpSpPr>
+        <p:cNvPr id="1" name=""/>
+        <p:cNvGrpSpPr/>
+        <p:nvPr/>
+      </p:nvGrpSpPr>
+      <p:grpSpPr>
+        <a:xfrm>
+          <a:off x="0" y="0"/>
+          <a:ext cx="0" cy="0"/>
+          <a:chOff x="0" y="0"/>
+          <a:chExt cx="0" cy="0"/>
+        </a:xfrm>
+      </p:grpSpPr>
+      <p:sp>
+        <p:nvSpPr>
+          <p:cNvPr id="2" name="Titel 1">
+            <a:extLst>
+              <a:ext uri="{FF2B5EF4-FFF2-40B4-BE49-F238E27FC236}">
+                <a16:creationId xmlns:a16="http://schemas.microsoft.com/office/drawing/2014/main" id="{AA5372BE-C2DC-3966-10C6-A44261C2D11A}"/>
+              </a:ext>
+            </a:extLst>
+          </p:cNvPr>
+          <p:cNvSpPr>
+            <a:spLocks noGrp="1"/>
+          </p:cNvSpPr>
+          <p:nvPr>
+            <p:ph type="title"/>
+          </p:nvPr>
+        </p:nvSpPr>
+        <p:spPr/>
+        <p:txBody>
+          <a:bodyPr/>
+          <a:lstStyle/>
+          <a:p>
+            <a:r>
+              <a:rPr lang="de" dirty="0"/>
+              <a:t>2.2.2 </a:t>
+            </a:r>
+            <a:r>
+              <a:rPr lang="de-DE" dirty="0"/>
+              <a:t>SSH Schlüsselerzeugen</a:t>
+            </a:r>
+          </a:p>
+        </p:txBody>
+      </p:sp>
+      <p:pic>
+        <p:nvPicPr>
+          <p:cNvPr id="5" name="Grafik 4">
+            <a:extLst>
+              <a:ext uri="{FF2B5EF4-FFF2-40B4-BE49-F238E27FC236}">
+                <a16:creationId xmlns:a16="http://schemas.microsoft.com/office/drawing/2014/main" id="{F30D2F4A-F177-FF40-7E9C-2E9F1755CD4E}"/>
+              </a:ext>
+            </a:extLst>
+          </p:cNvPr>
+          <p:cNvPicPr>
+            <a:picLocks noChangeAspect="1"/>
+          </p:cNvPicPr>
+          <p:nvPr/>
+        </p:nvPicPr>
+        <p:blipFill>
+          <a:blip r:embed="rId2"/>
+          <a:stretch>
+            <a:fillRect/>
+          </a:stretch>
+        </p:blipFill>
+        <p:spPr>
+          <a:xfrm>
+            <a:off x="1515247" y="791484"/>
+            <a:ext cx="6208806" cy="3560532"/>
+          </a:xfrm>
+          <a:prstGeom prst="rect">
+            <a:avLst/>
+          </a:prstGeom>
+        </p:spPr>
+      </p:pic>
+    </p:spTree>
+    <p:extLst>
+      <p:ext uri="{BB962C8B-B14F-4D97-AF65-F5344CB8AC3E}">
+        <p14:creationId xmlns:p14="http://schemas.microsoft.com/office/powerpoint/2010/main" val="1463984318"/>
+      </p:ext>
+    </p:extLst>
+  </p:cSld>
+  <p:clrMapOvr>
+    <a:masterClrMapping/>
+  </p:clrMapOvr>
+</p:sld>
+</file>
+
+<file path=ppt/slides/slide11.xml><?xml version="1.0" encoding="utf-8"?>
+<p:sld xmlns:a="http://schemas.openxmlformats.org/drawingml/2006/main" xmlns:r="http://schemas.openxmlformats.org/officeDocument/2006/relationships" xmlns:p="http://schemas.openxmlformats.org/presentationml/2006/main">
+  <p:cSld>
+    <p:spTree>
+      <p:nvGrpSpPr>
         <p:cNvPr id="1" name="Shape 126"/>
         <p:cNvGrpSpPr/>
         <p:nvPr/>
@@ -10522,10 +10615,10 @@
               <a:buNone/>
             </a:pPr>
             <a:r>
-              <a:rPr lang="de"/>
+              <a:rPr lang="de" dirty="0"/>
               <a:t>Git ist ein verteiltes Versionskontrollsystem (VCS). Das bedeutet, dass die Versionsdaten auf mehreren Geräten gleichzeitig liegen. </a:t>
             </a:r>
-            <a:endParaRPr/>
+            <a:endParaRPr dirty="0"/>
           </a:p>
           <a:p>
             <a:pPr marL="0" lvl="0" indent="0" algn="l" rtl="0">
@@ -10542,10 +10635,10 @@
               <a:buNone/>
             </a:pPr>
             <a:r>
-              <a:rPr lang="de"/>
+              <a:rPr lang="de" dirty="0"/>
               <a:t>Sie liegen auf den Endgeräten der Nutzer ( =&gt; Repository) und auf einem Server, auf den die Nutzer zugreifen ( =&gt; remote Repository).</a:t>
             </a:r>
-            <a:endParaRPr/>
+            <a:endParaRPr dirty="0"/>
           </a:p>
           <a:p>
             <a:pPr marL="0" lvl="0" indent="0" algn="l" rtl="0">
@@ -10561,7 +10654,7 @@
               <a:buSzPts val="1400"/>
               <a:buNone/>
             </a:pPr>
-            <a:endParaRPr/>
+            <a:endParaRPr dirty="0"/>
           </a:p>
           <a:p>
             <a:pPr marL="0" lvl="0" indent="0" algn="l" rtl="0">
@@ -10578,10 +10671,10 @@
               <a:buNone/>
             </a:pPr>
             <a:r>
-              <a:rPr lang="de"/>
+              <a:rPr lang="de" dirty="0"/>
               <a:t>Zur Nutzung von Git gehört immer:</a:t>
             </a:r>
-            <a:endParaRPr/>
+            <a:endParaRPr dirty="0"/>
           </a:p>
           <a:p>
             <a:pPr marL="457200" lvl="0" indent="-317500" algn="l" rtl="0">
@@ -10598,10 +10691,10 @@
               <a:buChar char="●"/>
             </a:pPr>
             <a:r>
-              <a:rPr lang="de"/>
+              <a:rPr lang="de" dirty="0"/>
               <a:t>Das Programm Git auf eurem PC</a:t>
             </a:r>
-            <a:endParaRPr/>
+            <a:endParaRPr dirty="0"/>
           </a:p>
           <a:p>
             <a:pPr marL="457200" lvl="0" indent="-317500" algn="l" rtl="0">
@@ -10618,10 +10711,10 @@
               <a:buChar char="●"/>
             </a:pPr>
             <a:r>
-              <a:rPr lang="de"/>
+              <a:rPr lang="de" dirty="0"/>
               <a:t>Ein Cloud Hosting Dienst für das remote Repository (Github, Gitlab, Gitea, …)</a:t>
             </a:r>
-            <a:endParaRPr/>
+            <a:endParaRPr dirty="0"/>
           </a:p>
           <a:p>
             <a:pPr marL="457200" lvl="0" indent="-317500" algn="l" rtl="0">
@@ -10638,26 +10731,10 @@
               <a:buChar char="●"/>
             </a:pPr>
             <a:r>
-              <a:rPr lang="de"/>
+              <a:rPr lang="de" dirty="0"/>
               <a:t>=&gt; Git ≠ Github / Gitlab / Gitea</a:t>
             </a:r>
-            <a:endParaRPr/>
-          </a:p>
-          <a:p>
-            <a:pPr marL="0" lvl="0" indent="0" algn="l" rtl="0">
-              <a:lnSpc>
-                <a:spcPct val="100000"/>
-              </a:lnSpc>
-              <a:spcBef>
-                <a:spcPts val="320"/>
-              </a:spcBef>
-              <a:spcAft>
-                <a:spcPts val="0"/>
-              </a:spcAft>
-              <a:buSzPts val="1400"/>
-              <a:buNone/>
-            </a:pPr>
-            <a:endParaRPr/>
+            <a:endParaRPr dirty="0"/>
           </a:p>
           <a:p>
             <a:pPr marL="0" lvl="0" indent="0" algn="l" rtl="0">
@@ -10674,10 +10751,10 @@
               <a:buNone/>
             </a:pPr>
             <a:r>
-              <a:rPr lang="de"/>
+              <a:rPr lang="de" dirty="0"/>
               <a:t>Anleitung zur Installation von Git: </a:t>
             </a:r>
-            <a:endParaRPr/>
+            <a:endParaRPr dirty="0"/>
           </a:p>
           <a:p>
             <a:pPr marL="457200" lvl="0" indent="-317500" algn="l" rtl="0">
@@ -10694,7 +10771,7 @@
               <a:buChar char="●"/>
             </a:pPr>
             <a:r>
-              <a:rPr lang="de" u="sng">
+              <a:rPr lang="de" u="sng" dirty="0">
                 <a:solidFill>
                   <a:schemeClr val="hlink"/>
                 </a:solidFill>
@@ -10702,7 +10779,103 @@
               </a:rPr>
               <a:t>https://www.linode.com/docs/guides/how-to-install-git-on-linux-mac-and-windows/</a:t>
             </a:r>
-            <a:endParaRPr/>
+            <a:endParaRPr lang="de" u="sng" dirty="0">
+              <a:solidFill>
+                <a:schemeClr val="hlink"/>
+              </a:solidFill>
+            </a:endParaRPr>
+          </a:p>
+          <a:p>
+            <a:pPr marL="457200" lvl="0" indent="-317500" algn="l" rtl="0">
+              <a:lnSpc>
+                <a:spcPct val="100000"/>
+              </a:lnSpc>
+              <a:spcBef>
+                <a:spcPts val="320"/>
+              </a:spcBef>
+              <a:spcAft>
+                <a:spcPts val="0"/>
+              </a:spcAft>
+              <a:buSzPts val="1400"/>
+              <a:buChar char="●"/>
+            </a:pPr>
+            <a:r>
+              <a:rPr lang="de" sz="1300" dirty="0">
+                <a:solidFill>
+                  <a:schemeClr val="tx1"/>
+                </a:solidFill>
+              </a:rPr>
+              <a:t>Bei Linux meist Vorinstalliert und bei Windows mit „</a:t>
+            </a:r>
+            <a:r>
+              <a:rPr lang="de-DE" sz="1300" dirty="0" err="1">
+                <a:solidFill>
+                  <a:schemeClr val="tx1"/>
+                </a:solidFill>
+              </a:rPr>
+              <a:t>winget</a:t>
+            </a:r>
+            <a:r>
+              <a:rPr lang="de-DE" sz="1300" dirty="0">
+                <a:solidFill>
+                  <a:schemeClr val="tx1"/>
+                </a:solidFill>
+              </a:rPr>
+              <a:t> </a:t>
+            </a:r>
+            <a:r>
+              <a:rPr lang="de-DE" sz="1300" dirty="0" err="1">
+                <a:solidFill>
+                  <a:schemeClr val="tx1"/>
+                </a:solidFill>
+              </a:rPr>
+              <a:t>install</a:t>
+            </a:r>
+            <a:r>
+              <a:rPr lang="de-DE" sz="1300" dirty="0">
+                <a:solidFill>
+                  <a:schemeClr val="tx1"/>
+                </a:solidFill>
+              </a:rPr>
+              <a:t> -e --</a:t>
+            </a:r>
+            <a:r>
+              <a:rPr lang="de-DE" sz="1300" dirty="0" err="1">
+                <a:solidFill>
+                  <a:schemeClr val="tx1"/>
+                </a:solidFill>
+              </a:rPr>
+              <a:t>id</a:t>
+            </a:r>
+            <a:r>
+              <a:rPr lang="de-DE" sz="1300" dirty="0">
+                <a:solidFill>
+                  <a:schemeClr val="tx1"/>
+                </a:solidFill>
+              </a:rPr>
+              <a:t> </a:t>
+            </a:r>
+            <a:r>
+              <a:rPr lang="de-DE" sz="1300" dirty="0" err="1">
+                <a:solidFill>
+                  <a:schemeClr val="tx1"/>
+                </a:solidFill>
+              </a:rPr>
+              <a:t>Git.Git</a:t>
+            </a:r>
+            <a:r>
+              <a:rPr lang="de" sz="1300" dirty="0">
+                <a:solidFill>
+                  <a:schemeClr val="tx1"/>
+                </a:solidFill>
+              </a:rPr>
+              <a:t>“ installierbar</a:t>
+            </a:r>
+            <a:endParaRPr sz="1300" dirty="0">
+              <a:solidFill>
+                <a:schemeClr val="tx1"/>
+              </a:solidFill>
+            </a:endParaRPr>
           </a:p>
         </p:txBody>
       </p:sp>
@@ -10714,7 +10887,7 @@
 </p:sld>
 </file>
 
-<file path=ppt/slides/slide11.xml><?xml version="1.0" encoding="utf-8"?>
+<file path=ppt/slides/slide12.xml><?xml version="1.0" encoding="utf-8"?>
 <p:sld xmlns:a="http://schemas.openxmlformats.org/drawingml/2006/main" xmlns:r="http://schemas.openxmlformats.org/officeDocument/2006/relationships" xmlns:p="http://schemas.openxmlformats.org/presentationml/2006/main">
   <p:cSld>
     <p:spTree>
@@ -11210,7 +11383,7 @@
 </p:sld>
 </file>
 
-<file path=ppt/slides/slide12.xml><?xml version="1.0" encoding="utf-8"?>
+<file path=ppt/slides/slide13.xml><?xml version="1.0" encoding="utf-8"?>
 <p:sld xmlns:a="http://schemas.openxmlformats.org/drawingml/2006/main" xmlns:r="http://schemas.openxmlformats.org/officeDocument/2006/relationships" xmlns:p="http://schemas.openxmlformats.org/presentationml/2006/main">
   <p:cSld>
     <p:spTree>
@@ -11532,7 +11705,7 @@
 </p:sld>
 </file>
 
-<file path=ppt/slides/slide13.xml><?xml version="1.0" encoding="utf-8"?>
+<file path=ppt/slides/slide14.xml><?xml version="1.0" encoding="utf-8"?>
 <p:sld xmlns:a="http://schemas.openxmlformats.org/drawingml/2006/main" xmlns:r="http://schemas.openxmlformats.org/officeDocument/2006/relationships" xmlns:p="http://schemas.openxmlformats.org/presentationml/2006/main">
   <p:cSld>
     <p:spTree>
@@ -12293,7 +12466,7 @@
 </p:sld>
 </file>
 
-<file path=ppt/slides/slide14.xml><?xml version="1.0" encoding="utf-8"?>
+<file path=ppt/slides/slide15.xml><?xml version="1.0" encoding="utf-8"?>
 <p:sld xmlns:a="http://schemas.openxmlformats.org/drawingml/2006/main" xmlns:r="http://schemas.openxmlformats.org/officeDocument/2006/relationships" xmlns:p="http://schemas.openxmlformats.org/presentationml/2006/main">
   <p:cSld>
     <p:spTree>
@@ -12540,7 +12713,7 @@
 </p:sld>
 </file>
 
-<file path=ppt/slides/slide15.xml><?xml version="1.0" encoding="utf-8"?>
+<file path=ppt/slides/slide16.xml><?xml version="1.0" encoding="utf-8"?>
 <p:sld xmlns:a="http://schemas.openxmlformats.org/drawingml/2006/main" xmlns:r="http://schemas.openxmlformats.org/officeDocument/2006/relationships" xmlns:p="http://schemas.openxmlformats.org/presentationml/2006/main">
   <p:cSld>
     <p:spTree>
@@ -14060,347 +14233,6 @@
       </p:grpSpPr>
       <p:sp>
         <p:nvSpPr>
-          <p:cNvPr id="3" name="Textplatzhalter 2">
-            <a:extLst>
-              <a:ext uri="{FF2B5EF4-FFF2-40B4-BE49-F238E27FC236}">
-                <a16:creationId xmlns:a16="http://schemas.microsoft.com/office/drawing/2014/main" id="{1B9719A4-9C9F-14FE-7EE3-C38C02B6B017}"/>
-              </a:ext>
-            </a:extLst>
-          </p:cNvPr>
-          <p:cNvSpPr>
-            <a:spLocks noGrp="1"/>
-          </p:cNvSpPr>
-          <p:nvPr>
-            <p:ph type="body" idx="1"/>
-          </p:nvPr>
-        </p:nvSpPr>
-        <p:spPr/>
-        <p:txBody>
-          <a:bodyPr/>
-          <a:lstStyle/>
-          <a:p>
-            <a:pPr marL="0" lvl="0" indent="0" hangingPunct="0">
-              <a:lnSpc>
-                <a:spcPct val="100000"/>
-              </a:lnSpc>
-              <a:spcBef>
-                <a:spcPts val="320"/>
-              </a:spcBef>
-              <a:buClr>
-                <a:srgbClr val="000000"/>
-              </a:buClr>
-              <a:buSzPct val="100000"/>
-              <a:buAutoNum type="arabicPeriod"/>
-            </a:pPr>
-            <a:r>
-              <a:rPr lang="de-none" sz="1600" dirty="0">
-                <a:solidFill>
-                  <a:srgbClr val="000000"/>
-                </a:solidFill>
-                <a:highlight>
-                  <a:scrgbClr r="0" g="0" b="0">
-                    <a:alpha val="0"/>
-                  </a:scrgbClr>
-                </a:highlight>
-                <a:latin typeface="Arial"/>
-                <a:cs typeface="Arial"/>
-              </a:rPr>
-              <a:t>Windows-Terminal (ab Windows 11 Vorinstalliert)</a:t>
-            </a:r>
-          </a:p>
-          <a:p>
-            <a:pPr marL="0" lvl="1" indent="0" hangingPunct="0">
-              <a:lnSpc>
-                <a:spcPct val="100000"/>
-              </a:lnSpc>
-              <a:spcBef>
-                <a:spcPts val="1417"/>
-              </a:spcBef>
-              <a:buSzPct val="75000"/>
-              <a:buFont typeface="OpenSymbol"/>
-              <a:buChar char="–"/>
-            </a:pPr>
-            <a:r>
-              <a:rPr lang="de-none" sz="1100" dirty="0">
-                <a:solidFill>
-                  <a:srgbClr val="000000"/>
-                </a:solidFill>
-                <a:highlight>
-                  <a:scrgbClr r="0" g="0" b="0">
-                    <a:alpha val="0"/>
-                  </a:scrgbClr>
-                </a:highlight>
-                <a:latin typeface="Arial"/>
-                <a:cs typeface="Arial"/>
-              </a:rPr>
-              <a:t>Bei Windows 10 über den Microsoft Store oder „winget install -e -id Microsoft.WindowsTerminal“</a:t>
-            </a:r>
-            <a:br>
-              <a:rPr lang="de-none" sz="1600" dirty="0">
-                <a:solidFill>
-                  <a:srgbClr val="000000"/>
-                </a:solidFill>
-                <a:highlight>
-                  <a:scrgbClr r="0" g="0" b="0">
-                    <a:alpha val="0"/>
-                  </a:scrgbClr>
-                </a:highlight>
-                <a:latin typeface="Arial"/>
-                <a:cs typeface="Arial"/>
-              </a:rPr>
-            </a:br>
-            <a:endParaRPr lang="de-none" sz="1600" dirty="0">
-              <a:solidFill>
-                <a:srgbClr val="000000"/>
-              </a:solidFill>
-              <a:highlight>
-                <a:scrgbClr r="0" g="0" b="0">
-                  <a:alpha val="0"/>
-                </a:scrgbClr>
-              </a:highlight>
-              <a:latin typeface="Arial"/>
-              <a:cs typeface="Arial"/>
-            </a:endParaRPr>
-          </a:p>
-          <a:p>
-            <a:pPr marL="342900" lvl="0" indent="-342900" hangingPunct="0">
-              <a:lnSpc>
-                <a:spcPct val="100000"/>
-              </a:lnSpc>
-              <a:spcBef>
-                <a:spcPts val="320"/>
-              </a:spcBef>
-              <a:buClr>
-                <a:srgbClr val="000000"/>
-              </a:buClr>
-              <a:buSzPct val="100000"/>
-              <a:buFont typeface="+mj-lt"/>
-              <a:buAutoNum type="arabicPeriod"/>
-            </a:pPr>
-            <a:r>
-              <a:rPr lang="de-none" sz="1600" dirty="0">
-                <a:solidFill>
-                  <a:srgbClr val="000000"/>
-                </a:solidFill>
-                <a:highlight>
-                  <a:scrgbClr r="0" g="0" b="0">
-                    <a:alpha val="0"/>
-                  </a:scrgbClr>
-                </a:highlight>
-                <a:latin typeface="Arial"/>
-                <a:cs typeface="Arial"/>
-              </a:rPr>
-              <a:t>WSL 2.0 (Windows Subsystem for Linux)</a:t>
-            </a:r>
-          </a:p>
-          <a:p>
-            <a:pPr marL="342900" lvl="1" hangingPunct="0">
-              <a:lnSpc>
-                <a:spcPct val="100000"/>
-              </a:lnSpc>
-              <a:spcBef>
-                <a:spcPts val="0"/>
-              </a:spcBef>
-              <a:buClr>
-                <a:srgbClr val="000000"/>
-              </a:buClr>
-              <a:buSzPct val="100000"/>
-              <a:buFont typeface="+mj-lt"/>
-              <a:buAutoNum type="arabicPeriod"/>
-            </a:pPr>
-            <a:r>
-              <a:rPr lang="de-none" sz="1600" dirty="0">
-                <a:solidFill>
-                  <a:srgbClr val="000000"/>
-                </a:solidFill>
-                <a:highlight>
-                  <a:scrgbClr r="0" g="0" b="0">
-                    <a:alpha val="0"/>
-                  </a:scrgbClr>
-                </a:highlight>
-                <a:latin typeface="Arial"/>
-                <a:cs typeface="Arial"/>
-              </a:rPr>
-              <a:t>Linux parallel auf dem Windows nutzen</a:t>
-            </a:r>
-          </a:p>
-          <a:p>
-            <a:pPr marL="342900" lvl="1" hangingPunct="0">
-              <a:lnSpc>
-                <a:spcPct val="100000"/>
-              </a:lnSpc>
-              <a:spcBef>
-                <a:spcPts val="0"/>
-              </a:spcBef>
-              <a:buClr>
-                <a:srgbClr val="000000"/>
-              </a:buClr>
-              <a:buSzPct val="100000"/>
-              <a:buFont typeface="+mj-lt"/>
-              <a:buAutoNum type="arabicPeriod"/>
-            </a:pPr>
-            <a:r>
-              <a:rPr lang="de-none" sz="1600" dirty="0">
-                <a:solidFill>
-                  <a:srgbClr val="000000"/>
-                </a:solidFill>
-                <a:highlight>
-                  <a:scrgbClr r="0" g="0" b="0">
-                    <a:alpha val="0"/>
-                  </a:scrgbClr>
-                </a:highlight>
-                <a:latin typeface="Arial"/>
-                <a:cs typeface="Arial"/>
-              </a:rPr>
-              <a:t>Auch hier entweder über den Microsoft Store oder über winget</a:t>
-            </a:r>
-          </a:p>
-          <a:p>
-            <a:pPr marL="171450" lvl="3" indent="-171450" hangingPunct="0">
-              <a:spcBef>
-                <a:spcPts val="1417"/>
-              </a:spcBef>
-              <a:buSzPct val="45000"/>
-            </a:pPr>
-            <a:r>
-              <a:rPr lang="de-none" sz="1100" dirty="0">
-                <a:solidFill>
-                  <a:srgbClr val="000000"/>
-                </a:solidFill>
-                <a:highlight>
-                  <a:scrgbClr r="0" g="0" b="0">
-                    <a:alpha val="0"/>
-                  </a:scrgbClr>
-                </a:highlight>
-                <a:latin typeface="Arial"/>
-                <a:cs typeface="Arial"/>
-              </a:rPr>
-              <a:t>Für Ubuntu zum Beispiel „winget install -e -id Canonical.Ubuntu.2204“</a:t>
-            </a:r>
-          </a:p>
-          <a:p>
-            <a:pPr marL="171450" lvl="3" indent="-171450" hangingPunct="0">
-              <a:spcBef>
-                <a:spcPts val="1417"/>
-              </a:spcBef>
-              <a:buSzPct val="45000"/>
-            </a:pPr>
-            <a:r>
-              <a:rPr lang="de-none" sz="1100" dirty="0">
-                <a:solidFill>
-                  <a:srgbClr val="000000"/>
-                </a:solidFill>
-                <a:highlight>
-                  <a:scrgbClr r="0" g="0" b="0">
-                    <a:alpha val="0"/>
-                  </a:scrgbClr>
-                </a:highlight>
-                <a:latin typeface="Arial"/>
-                <a:cs typeface="Arial"/>
-              </a:rPr>
-              <a:t>Empfehlung: Kali Linux in seiner Full Installation, da hier auch parallel Linux GUI Anwendungen genutzt werden können </a:t>
-            </a:r>
-            <a:br>
-              <a:rPr lang="de-none" sz="1600" dirty="0">
-                <a:solidFill>
-                  <a:srgbClr val="000000"/>
-                </a:solidFill>
-                <a:highlight>
-                  <a:scrgbClr r="0" g="0" b="0">
-                    <a:alpha val="0"/>
-                  </a:scrgbClr>
-                </a:highlight>
-                <a:latin typeface="Arial"/>
-                <a:cs typeface="Arial"/>
-              </a:rPr>
-            </a:br>
-            <a:endParaRPr lang="de-none" sz="1600" dirty="0">
-              <a:solidFill>
-                <a:srgbClr val="000000"/>
-              </a:solidFill>
-              <a:highlight>
-                <a:scrgbClr r="0" g="0" b="0">
-                  <a:alpha val="0"/>
-                </a:scrgbClr>
-              </a:highlight>
-              <a:latin typeface="Arial"/>
-              <a:cs typeface="Arial"/>
-            </a:endParaRPr>
-          </a:p>
-        </p:txBody>
-      </p:sp>
-      <p:sp>
-        <p:nvSpPr>
-          <p:cNvPr id="2" name="Titel 1">
-            <a:extLst>
-              <a:ext uri="{FF2B5EF4-FFF2-40B4-BE49-F238E27FC236}">
-                <a16:creationId xmlns:a16="http://schemas.microsoft.com/office/drawing/2014/main" id="{38C4BDC4-8947-0B0B-4E5F-09032366A202}"/>
-              </a:ext>
-            </a:extLst>
-          </p:cNvPr>
-          <p:cNvSpPr>
-            <a:spLocks noGrp="1"/>
-          </p:cNvSpPr>
-          <p:nvPr>
-            <p:ph type="title"/>
-          </p:nvPr>
-        </p:nvSpPr>
-        <p:spPr/>
-        <p:txBody>
-          <a:bodyPr/>
-          <a:lstStyle/>
-          <a:p>
-            <a:r>
-              <a:rPr lang="de-none" sz="2200" b="1" dirty="0">
-                <a:solidFill>
-                  <a:srgbClr val="000000"/>
-                </a:solidFill>
-                <a:highlight>
-                  <a:scrgbClr r="0" g="0" b="0">
-                    <a:alpha val="0"/>
-                  </a:scrgbClr>
-                </a:highlight>
-                <a:latin typeface="Arial"/>
-                <a:cs typeface="Arial"/>
-              </a:rPr>
-              <a:t>1.1. Terminal und WSL (ab Windows 10)</a:t>
-            </a:r>
-            <a:endParaRPr lang="de-DE" dirty="0"/>
-          </a:p>
-        </p:txBody>
-      </p:sp>
-    </p:spTree>
-    <p:extLst>
-      <p:ext uri="{BB962C8B-B14F-4D97-AF65-F5344CB8AC3E}">
-        <p14:creationId xmlns:p14="http://schemas.microsoft.com/office/powerpoint/2010/main" val="3931121811"/>
-      </p:ext>
-    </p:extLst>
-  </p:cSld>
-  <p:clrMapOvr>
-    <a:masterClrMapping/>
-  </p:clrMapOvr>
-</p:sld>
-</file>
-
-<file path=ppt/slides/slide6.xml><?xml version="1.0" encoding="utf-8"?>
-<p:sld xmlns:a="http://schemas.openxmlformats.org/drawingml/2006/main" xmlns:r="http://schemas.openxmlformats.org/officeDocument/2006/relationships" xmlns:p="http://schemas.openxmlformats.org/presentationml/2006/main">
-  <p:cSld>
-    <p:spTree>
-      <p:nvGrpSpPr>
-        <p:cNvPr id="1" name=""/>
-        <p:cNvGrpSpPr/>
-        <p:nvPr/>
-      </p:nvGrpSpPr>
-      <p:grpSpPr>
-        <a:xfrm>
-          <a:off x="0" y="0"/>
-          <a:ext cx="0" cy="0"/>
-          <a:chOff x="0" y="0"/>
-          <a:chExt cx="0" cy="0"/>
-        </a:xfrm>
-      </p:grpSpPr>
-      <p:sp>
-        <p:nvSpPr>
           <p:cNvPr id="2" name="Titel 1">
             <a:extLst>
               <a:ext uri="{FF2B5EF4-FFF2-40B4-BE49-F238E27FC236}">
@@ -14493,14 +14325,15 @@
                   <a:alpha val="0"/>
                 </a:scrgbClr>
               </a:highlight>
-              <a:latin typeface="Arial"/>
-              <a:cs typeface="Arial"/>
             </a:endParaRPr>
           </a:p>
           <a:p>
-            <a:pPr marL="939800" lvl="1"/>
+            <a:pPr lvl="1">
+              <a:buFont typeface="Arial" panose="020B0604020202020204" pitchFamily="34" charset="0"/>
+              <a:buChar char="•"/>
+            </a:pPr>
             <a:r>
-              <a:rPr lang="de-none" sz="1200" dirty="0">
+              <a:rPr lang="de-none" sz="1300" dirty="0">
                 <a:solidFill>
                   <a:srgbClr val="000000"/>
                 </a:solidFill>
@@ -14514,7 +14347,7 @@
               </a:rPr>
               <a:t>Bei Windows 10 über den Microsoft Store oder „winget install -e -id Microsoft.WindowsTerminal“</a:t>
             </a:r>
-            <a:endParaRPr lang="de-DE" sz="1200" dirty="0">
+            <a:endParaRPr lang="de-DE" sz="1300" dirty="0">
               <a:solidFill>
                 <a:srgbClr val="000000"/>
               </a:solidFill>
@@ -14528,7 +14361,7 @@
             </a:endParaRPr>
           </a:p>
           <a:p>
-            <a:pPr marL="482600">
+            <a:pPr marL="508000" indent="-342900">
               <a:buFont typeface="+mj-lt"/>
               <a:buAutoNum type="arabicPeriod"/>
             </a:pPr>
@@ -14607,8 +14440,8 @@
         </p:nvSpPr>
         <p:spPr>
           <a:xfrm>
-            <a:off x="1029400" y="1905211"/>
-            <a:ext cx="3676757" cy="2274478"/>
+            <a:off x="979200" y="1996022"/>
+            <a:ext cx="3726957" cy="2274478"/>
           </a:xfrm>
           <a:prstGeom prst="rect">
             <a:avLst/>
@@ -14870,7 +14703,7 @@
             </a:lvl9pPr>
           </a:lstStyle>
           <a:p>
-            <a:pPr marL="342900" lvl="1" hangingPunct="0">
+            <a:pPr marL="266700" lvl="1" indent="-266700" hangingPunct="0">
               <a:spcBef>
                 <a:spcPts val="0"/>
               </a:spcBef>
@@ -14878,9 +14711,11 @@
                 <a:srgbClr val="000000"/>
               </a:buClr>
               <a:buSzPct val="100000"/>
+              <a:buFont typeface="Arial" panose="020B0604020202020204" pitchFamily="34" charset="0"/>
+              <a:buChar char="•"/>
             </a:pPr>
             <a:r>
-              <a:rPr lang="de-none" sz="1200" dirty="0">
+              <a:rPr lang="de-none" sz="1300" dirty="0">
                 <a:solidFill>
                   <a:srgbClr val="000000"/>
                 </a:solidFill>
@@ -14894,7 +14729,7 @@
               </a:rPr>
               <a:t>Linux parallel auf dem Windows nutzen</a:t>
             </a:r>
-            <a:endParaRPr lang="de-DE" sz="1200" dirty="0">
+            <a:endParaRPr lang="de-DE" sz="1300" dirty="0">
               <a:solidFill>
                 <a:srgbClr val="000000"/>
               </a:solidFill>
@@ -14908,7 +14743,7 @@
             </a:endParaRPr>
           </a:p>
           <a:p>
-            <a:pPr marL="342900" lvl="1" hangingPunct="0">
+            <a:pPr marL="266700" lvl="1" indent="-266700" hangingPunct="0">
               <a:spcBef>
                 <a:spcPts val="0"/>
               </a:spcBef>
@@ -14916,8 +14751,10 @@
                 <a:srgbClr val="000000"/>
               </a:buClr>
               <a:buSzPct val="100000"/>
+              <a:buFont typeface="Arial" panose="020B0604020202020204" pitchFamily="34" charset="0"/>
+              <a:buChar char="•"/>
             </a:pPr>
-            <a:endParaRPr lang="de-none" sz="1200" dirty="0">
+            <a:endParaRPr lang="de-none" sz="1300" dirty="0">
               <a:solidFill>
                 <a:srgbClr val="000000"/>
               </a:solidFill>
@@ -14931,7 +14768,7 @@
             </a:endParaRPr>
           </a:p>
           <a:p>
-            <a:pPr marL="342900" lvl="1" hangingPunct="0">
+            <a:pPr marL="266700" lvl="1" indent="-266700" hangingPunct="0">
               <a:spcBef>
                 <a:spcPts val="0"/>
               </a:spcBef>
@@ -14939,9 +14776,11 @@
                 <a:srgbClr val="000000"/>
               </a:buClr>
               <a:buSzPct val="100000"/>
+              <a:buFont typeface="Arial" panose="020B0604020202020204" pitchFamily="34" charset="0"/>
+              <a:buChar char="•"/>
             </a:pPr>
             <a:r>
-              <a:rPr lang="de-none" sz="1200" dirty="0">
+              <a:rPr lang="de-none" sz="1300" dirty="0">
                 <a:solidFill>
                   <a:srgbClr val="000000"/>
                 </a:solidFill>
@@ -14955,7 +14794,7 @@
               </a:rPr>
               <a:t>Auch hier entweder über den Microsoft Store oder über winget</a:t>
             </a:r>
-            <a:endParaRPr lang="de-DE" sz="1200" dirty="0">
+            <a:endParaRPr lang="de-DE" sz="1300" dirty="0">
               <a:solidFill>
                 <a:srgbClr val="000000"/>
               </a:solidFill>
@@ -14969,7 +14808,7 @@
             </a:endParaRPr>
           </a:p>
           <a:p>
-            <a:pPr marL="342900" lvl="1" hangingPunct="0">
+            <a:pPr marL="266700" lvl="1" indent="-266700" hangingPunct="0">
               <a:spcBef>
                 <a:spcPts val="0"/>
               </a:spcBef>
@@ -14977,8 +14816,10 @@
                 <a:srgbClr val="000000"/>
               </a:buClr>
               <a:buSzPct val="100000"/>
+              <a:buFont typeface="Arial" panose="020B0604020202020204" pitchFamily="34" charset="0"/>
+              <a:buChar char="•"/>
             </a:pPr>
-            <a:endParaRPr lang="de-DE" sz="1200" dirty="0">
+            <a:endParaRPr lang="de-DE" sz="1300" dirty="0">
               <a:solidFill>
                 <a:srgbClr val="000000"/>
               </a:solidFill>
@@ -14990,7 +14831,7 @@
             </a:endParaRPr>
           </a:p>
           <a:p>
-            <a:pPr marL="342900" lvl="1" hangingPunct="0">
+            <a:pPr marL="266700" lvl="1" indent="-266700" hangingPunct="0">
               <a:spcBef>
                 <a:spcPts val="0"/>
               </a:spcBef>
@@ -14998,9 +14839,11 @@
                 <a:srgbClr val="000000"/>
               </a:buClr>
               <a:buSzPct val="100000"/>
+              <a:buFont typeface="Arial" panose="020B0604020202020204" pitchFamily="34" charset="0"/>
+              <a:buChar char="•"/>
             </a:pPr>
             <a:r>
-              <a:rPr lang="de-none" sz="1200" dirty="0">
+              <a:rPr lang="de-none" sz="1300" dirty="0">
                 <a:solidFill>
                   <a:srgbClr val="000000"/>
                 </a:solidFill>
@@ -15015,7 +14858,7 @@
               <a:t>Für Ubuntu z</a:t>
             </a:r>
             <a:r>
-              <a:rPr lang="de-DE" sz="1200" dirty="0">
+              <a:rPr lang="de-DE" sz="1300" dirty="0">
                 <a:solidFill>
                   <a:srgbClr val="000000"/>
                 </a:solidFill>
@@ -15030,7 +14873,7 @@
               <a:t>.B. </a:t>
             </a:r>
             <a:r>
-              <a:rPr lang="de-none" sz="1200" dirty="0">
+              <a:rPr lang="de-none" sz="1300" dirty="0">
                 <a:solidFill>
                   <a:srgbClr val="000000"/>
                 </a:solidFill>
@@ -15046,7 +14889,7 @@
             </a:r>
           </a:p>
           <a:p>
-            <a:pPr marL="342900" lvl="1" hangingPunct="0">
+            <a:pPr marL="266700" lvl="1" indent="-266700" hangingPunct="0">
               <a:spcBef>
                 <a:spcPts val="0"/>
               </a:spcBef>
@@ -15054,8 +14897,10 @@
                 <a:srgbClr val="000000"/>
               </a:buClr>
               <a:buSzPct val="100000"/>
+              <a:buFont typeface="Arial" panose="020B0604020202020204" pitchFamily="34" charset="0"/>
+              <a:buChar char="•"/>
             </a:pPr>
-            <a:endParaRPr lang="de-DE" sz="1200" dirty="0">
+            <a:endParaRPr lang="de-DE" sz="1300" dirty="0">
               <a:solidFill>
                 <a:srgbClr val="000000"/>
               </a:solidFill>
@@ -15069,7 +14914,7 @@
             </a:endParaRPr>
           </a:p>
           <a:p>
-            <a:pPr marL="342900" lvl="1" hangingPunct="0">
+            <a:pPr marL="266700" lvl="1" indent="-266700" hangingPunct="0">
               <a:spcBef>
                 <a:spcPts val="0"/>
               </a:spcBef>
@@ -15077,9 +14922,11 @@
                 <a:srgbClr val="000000"/>
               </a:buClr>
               <a:buSzPct val="100000"/>
+              <a:buFont typeface="Arial" panose="020B0604020202020204" pitchFamily="34" charset="0"/>
+              <a:buChar char="•"/>
             </a:pPr>
             <a:r>
-              <a:rPr lang="de-none" sz="1200" dirty="0">
+              <a:rPr lang="de-none" sz="1300" dirty="0">
                 <a:solidFill>
                   <a:srgbClr val="000000"/>
                 </a:solidFill>
@@ -15094,7 +14941,7 @@
               <a:t>Empfehlung: Kali Linux</a:t>
             </a:r>
             <a:r>
-              <a:rPr lang="de-DE" sz="1200" dirty="0">
+              <a:rPr lang="de-DE" sz="1300" dirty="0">
                 <a:solidFill>
                   <a:srgbClr val="000000"/>
                 </a:solidFill>
@@ -15109,7 +14956,7 @@
               <a:t> mit </a:t>
             </a:r>
             <a:r>
-              <a:rPr lang="de-DE" sz="1200" dirty="0" err="1">
+              <a:rPr lang="de-DE" sz="1300" dirty="0" err="1">
                 <a:solidFill>
                   <a:srgbClr val="000000"/>
                 </a:solidFill>
@@ -15124,7 +14971,7 @@
               <a:t>Win-KeX</a:t>
             </a:r>
             <a:r>
-              <a:rPr lang="de-DE" sz="1200" dirty="0">
+              <a:rPr lang="de-DE" sz="1300" dirty="0">
                 <a:solidFill>
                   <a:srgbClr val="000000"/>
                 </a:solidFill>
@@ -15221,7 +15068,7 @@
 </p:sld>
 </file>
 
-<file path=ppt/slides/slide7.xml><?xml version="1.0" encoding="utf-8"?>
+<file path=ppt/slides/slide6.xml><?xml version="1.0" encoding="utf-8"?>
 <p:sld xmlns:a="http://schemas.openxmlformats.org/drawingml/2006/main" xmlns:r="http://schemas.openxmlformats.org/officeDocument/2006/relationships" xmlns:p="http://schemas.openxmlformats.org/presentationml/2006/main">
   <p:cSld>
     <p:spTree>
@@ -15331,10 +15178,10 @@
               <a:buNone/>
             </a:pPr>
             <a:r>
-              <a:rPr lang="de"/>
+              <a:rPr lang="de" dirty="0"/>
               <a:t>Für die Programmiersprache Java gibt es mehrere installierbare Pakete:</a:t>
             </a:r>
-            <a:endParaRPr/>
+            <a:endParaRPr dirty="0"/>
           </a:p>
           <a:p>
             <a:pPr marL="457200" lvl="0" indent="-317500" algn="l" rtl="0">
@@ -15351,10 +15198,10 @@
               <a:buChar char="●"/>
             </a:pPr>
             <a:r>
-              <a:rPr lang="de"/>
+              <a:rPr lang="de" dirty="0"/>
               <a:t>JRE (Java Runtime Environment) </a:t>
             </a:r>
-            <a:endParaRPr/>
+            <a:endParaRPr dirty="0"/>
           </a:p>
           <a:p>
             <a:pPr marL="914400" lvl="0" indent="-317500" algn="l" rtl="0">
@@ -15371,10 +15218,10 @@
               <a:buChar char="-"/>
             </a:pPr>
             <a:r>
-              <a:rPr lang="de"/>
+              <a:rPr lang="de" dirty="0"/>
               <a:t>notwendig zum Ausführen von Java Programmen, enthält u.A. die JVM</a:t>
             </a:r>
-            <a:endParaRPr/>
+            <a:endParaRPr dirty="0"/>
           </a:p>
           <a:p>
             <a:pPr marL="457200" lvl="0" indent="-317500" algn="l" rtl="0">
@@ -15391,10 +15238,10 @@
               <a:buChar char="●"/>
             </a:pPr>
             <a:r>
-              <a:rPr lang="de"/>
+              <a:rPr lang="de" dirty="0"/>
               <a:t>JDK (Java Development Kit)</a:t>
             </a:r>
-            <a:endParaRPr/>
+            <a:endParaRPr dirty="0"/>
           </a:p>
           <a:p>
             <a:pPr marL="914400" lvl="0" indent="-317500" algn="l" rtl="0">
@@ -15411,10 +15258,10 @@
               <a:buChar char="-"/>
             </a:pPr>
             <a:r>
-              <a:rPr lang="de"/>
+              <a:rPr lang="de" dirty="0"/>
               <a:t>notwendig zum Entwickeln von Java Programmen, enthält u.A. den Compiler und Bibliotheken</a:t>
             </a:r>
-            <a:endParaRPr/>
+            <a:endParaRPr dirty="0"/>
           </a:p>
           <a:p>
             <a:pPr marL="0" lvl="0" indent="0" algn="l" rtl="0">
@@ -15430,7 +15277,7 @@
               <a:buSzPts val="1400"/>
               <a:buNone/>
             </a:pPr>
-            <a:endParaRPr/>
+            <a:endParaRPr dirty="0"/>
           </a:p>
           <a:p>
             <a:pPr marL="0" lvl="0" indent="0" algn="l" rtl="0">
@@ -15447,26 +15294,26 @@
               <a:buNone/>
             </a:pPr>
             <a:r>
-              <a:rPr lang="de"/>
+              <a:rPr lang="de" dirty="0"/>
               <a:t>Ihr braucht </a:t>
             </a:r>
             <a:r>
-              <a:rPr lang="de" u="sng"/>
+              <a:rPr lang="de" u="sng" dirty="0"/>
               <a:t>nur das JDK</a:t>
             </a:r>
             <a:r>
-              <a:rPr lang="de"/>
+              <a:rPr lang="de" dirty="0"/>
               <a:t>, da dieses </a:t>
             </a:r>
             <a:r>
-              <a:rPr lang="de" u="sng"/>
+              <a:rPr lang="de" u="sng" dirty="0"/>
               <a:t>das JRE bereits beinhaltet</a:t>
             </a:r>
             <a:r>
-              <a:rPr lang="de"/>
+              <a:rPr lang="de" dirty="0"/>
               <a:t>.</a:t>
             </a:r>
-            <a:endParaRPr/>
+            <a:endParaRPr dirty="0"/>
           </a:p>
         </p:txBody>
       </p:sp>
@@ -15478,7 +15325,7 @@
 </p:sld>
 </file>
 
-<file path=ppt/slides/slide8.xml><?xml version="1.0" encoding="utf-8"?>
+<file path=ppt/slides/slide7.xml><?xml version="1.0" encoding="utf-8"?>
 <p:sld xmlns:a="http://schemas.openxmlformats.org/drawingml/2006/main" xmlns:r="http://schemas.openxmlformats.org/officeDocument/2006/relationships" xmlns:p="http://schemas.openxmlformats.org/presentationml/2006/main">
   <p:cSld>
     <p:spTree>
@@ -15588,10 +15435,10 @@
               <a:buNone/>
             </a:pPr>
             <a:r>
-              <a:rPr lang="de"/>
+              <a:rPr lang="de" dirty="0"/>
               <a:t>Installationsanleitungen für verschiedene Betriebssysteme:</a:t>
             </a:r>
-            <a:endParaRPr/>
+            <a:endParaRPr dirty="0"/>
           </a:p>
           <a:p>
             <a:pPr marL="0" lvl="0" indent="0" algn="l" rtl="0">
@@ -15607,7 +15454,7 @@
               <a:buSzPts val="1400"/>
               <a:buNone/>
             </a:pPr>
-            <a:endParaRPr/>
+            <a:endParaRPr dirty="0"/>
           </a:p>
           <a:p>
             <a:pPr marL="457200" lvl="0" indent="-298450" algn="l" rtl="0">
@@ -15624,10 +15471,10 @@
               <a:buChar char="●"/>
             </a:pPr>
             <a:r>
-              <a:rPr lang="de" sz="1300"/>
+              <a:rPr lang="de" sz="1300" dirty="0"/>
               <a:t>Windows</a:t>
             </a:r>
-            <a:endParaRPr sz="1300"/>
+            <a:endParaRPr sz="1300" dirty="0"/>
           </a:p>
           <a:p>
             <a:pPr marL="914400" lvl="1" indent="-323850" algn="l" rtl="0">
@@ -15644,11 +15491,11 @@
               <a:buChar char="-"/>
             </a:pPr>
             <a:r>
-              <a:rPr lang="de" sz="1300"/>
+              <a:rPr lang="de" sz="1300" dirty="0"/>
               <a:t>Manuell: </a:t>
             </a:r>
             <a:r>
-              <a:rPr lang="de" sz="1300" u="sng">
+              <a:rPr lang="de" sz="1300" u="sng" dirty="0">
                 <a:solidFill>
                   <a:schemeClr val="accent1"/>
                 </a:solidFill>
@@ -15656,9 +15503,9 @@
               <a:t>https://learn.microsoft.com/de-de/java/openjdk/install</a:t>
             </a:r>
             <a:br>
-              <a:rPr lang="de" sz="1300"/>
+              <a:rPr lang="de" sz="1300" dirty="0"/>
             </a:br>
-            <a:endParaRPr sz="1300"/>
+            <a:endParaRPr sz="1300" dirty="0"/>
           </a:p>
           <a:p>
             <a:pPr marL="457200" lvl="0" indent="-298450" algn="l" rtl="0">
@@ -15675,10 +15522,10 @@
               <a:buChar char="●"/>
             </a:pPr>
             <a:r>
-              <a:rPr lang="de" sz="1300"/>
+              <a:rPr lang="de" sz="1300" dirty="0"/>
               <a:t>Linux (Ubuntu)</a:t>
             </a:r>
-            <a:endParaRPr sz="1300"/>
+            <a:endParaRPr sz="1300" dirty="0"/>
           </a:p>
           <a:p>
             <a:pPr marL="914400" lvl="1" indent="-323850" algn="l" rtl="0">
@@ -15695,11 +15542,11 @@
               <a:buChar char="-"/>
             </a:pPr>
             <a:r>
-              <a:rPr lang="de" sz="1300"/>
+              <a:rPr lang="de" sz="1300" dirty="0"/>
               <a:t>APT: </a:t>
             </a:r>
             <a:r>
-              <a:rPr lang="de" sz="1300" u="sng">
+              <a:rPr lang="de" sz="1300" u="sng" dirty="0">
                 <a:solidFill>
                   <a:schemeClr val="accent1"/>
                 </a:solidFill>
@@ -15707,9 +15554,9 @@
               <a:t>https://wiki.ubuntuusers.de/Java/Installation/OpenJDK/</a:t>
             </a:r>
             <a:br>
-              <a:rPr lang="de" sz="1300"/>
+              <a:rPr lang="de" sz="1300" dirty="0"/>
             </a:br>
-            <a:endParaRPr sz="1300"/>
+            <a:endParaRPr sz="1300" dirty="0"/>
           </a:p>
           <a:p>
             <a:pPr marL="457200" lvl="0" indent="-298450" algn="l" rtl="0">
@@ -15726,10 +15573,10 @@
               <a:buChar char="●"/>
             </a:pPr>
             <a:r>
-              <a:rPr lang="de" sz="1300"/>
+              <a:rPr lang="de" sz="1300" dirty="0"/>
               <a:t>MacOS</a:t>
             </a:r>
-            <a:endParaRPr sz="1300"/>
+            <a:endParaRPr sz="1300" dirty="0"/>
           </a:p>
           <a:p>
             <a:pPr marL="914400" lvl="1" indent="-323850" algn="l" rtl="0">
@@ -15746,18 +15593,18 @@
               <a:buChar char="-"/>
             </a:pPr>
             <a:r>
-              <a:rPr lang="de" sz="1300"/>
+              <a:rPr lang="de" sz="1300" dirty="0"/>
               <a:t>Brew: </a:t>
             </a:r>
             <a:r>
-              <a:rPr lang="de" sz="1300" u="sng">
+              <a:rPr lang="de" sz="1300" u="sng" dirty="0">
                 <a:solidFill>
                   <a:schemeClr val="accent1"/>
                 </a:solidFill>
               </a:rPr>
               <a:t>https://mkyong.com/java/how-to-install-java-on-mac-osx/</a:t>
             </a:r>
-            <a:endParaRPr sz="1300" u="sng">
+            <a:endParaRPr sz="1300" u="sng" dirty="0">
               <a:solidFill>
                 <a:schemeClr val="accent1"/>
               </a:solidFill>
@@ -15773,7 +15620,7 @@
 </p:sld>
 </file>
 
-<file path=ppt/slides/slide9.xml><?xml version="1.0" encoding="utf-8"?>
+<file path=ppt/slides/slide8.xml><?xml version="1.0" encoding="utf-8"?>
 <p:sld xmlns:a="http://schemas.openxmlformats.org/drawingml/2006/main" xmlns:r="http://schemas.openxmlformats.org/officeDocument/2006/relationships" xmlns:p="http://schemas.openxmlformats.org/presentationml/2006/main">
   <p:cSld>
     <p:spTree>
@@ -15833,10 +15680,10 @@
               <a:buNone/>
             </a:pPr>
             <a:r>
-              <a:rPr lang="de"/>
+              <a:rPr lang="de" dirty="0"/>
               <a:t>2.2. SSH Schlüsselpaar generieren</a:t>
             </a:r>
-            <a:endParaRPr/>
+            <a:endParaRPr dirty="0"/>
           </a:p>
           <a:p>
             <a:pPr marL="0" lvl="0" indent="0" algn="l" rtl="0">
@@ -15853,10 +15700,10 @@
               <a:buNone/>
             </a:pPr>
             <a:r>
-              <a:rPr lang="de" sz="1100"/>
+              <a:rPr lang="de" sz="1100" dirty="0"/>
               <a:t>(nicht wichtig für das Tutorium)</a:t>
             </a:r>
-            <a:endParaRPr sz="1100"/>
+            <a:endParaRPr sz="1100" dirty="0"/>
           </a:p>
         </p:txBody>
       </p:sp>
@@ -15873,7 +15720,7 @@
         <p:spPr>
           <a:xfrm>
             <a:off x="431800" y="969675"/>
-            <a:ext cx="8375700" cy="3375000"/>
+            <a:ext cx="8215400" cy="3375000"/>
           </a:xfrm>
           <a:prstGeom prst="rect">
             <a:avLst/>
@@ -15903,10 +15750,10 @@
               <a:buNone/>
             </a:pPr>
             <a:r>
-              <a:rPr lang="de"/>
+              <a:rPr lang="de" dirty="0"/>
               <a:t>Zur automatischen Authentifizierung bei der Nutzung von Git wird ein sogenanntes SSH-Schlüsselpaar benötigt. </a:t>
             </a:r>
-            <a:endParaRPr/>
+            <a:endParaRPr dirty="0"/>
           </a:p>
           <a:p>
             <a:pPr marL="0" lvl="0" indent="0" algn="l" rtl="0">
@@ -15923,10 +15770,10 @@
               <a:buNone/>
             </a:pPr>
             <a:r>
-              <a:rPr lang="de"/>
+              <a:rPr lang="de" dirty="0"/>
               <a:t>Dieses besteht aus einem öffentlichen und einem privaten Schlüssel. </a:t>
             </a:r>
-            <a:endParaRPr/>
+            <a:endParaRPr dirty="0"/>
           </a:p>
           <a:p>
             <a:pPr marL="0" lvl="0" indent="0" algn="l" rtl="0">
@@ -15943,10 +15790,10 @@
               <a:buNone/>
             </a:pPr>
             <a:r>
-              <a:rPr lang="de"/>
+              <a:rPr lang="de" dirty="0"/>
               <a:t>Den öffentlichen Schlüssel stellt man Git zur Verfügung.</a:t>
             </a:r>
-            <a:endParaRPr/>
+            <a:endParaRPr dirty="0"/>
           </a:p>
           <a:p>
             <a:pPr marL="0" lvl="0" indent="0" algn="l" rtl="0">
@@ -15962,7 +15809,7 @@
               <a:buSzPts val="1400"/>
               <a:buNone/>
             </a:pPr>
-            <a:endParaRPr/>
+            <a:endParaRPr dirty="0"/>
           </a:p>
           <a:p>
             <a:pPr marL="0" lvl="0" indent="0" algn="l" rtl="0">
@@ -15979,27 +15826,17 @@
               <a:buNone/>
             </a:pPr>
             <a:r>
-              <a:rPr lang="de"/>
+              <a:rPr lang="de" dirty="0"/>
               <a:t>Generierung auf den verschiedenen Betriebssystemen:</a:t>
             </a:r>
-            <a:endParaRPr/>
-          </a:p>
-          <a:p>
-            <a:pPr marL="457200" lvl="0" indent="-298450" algn="l" rtl="0">
-              <a:lnSpc>
-                <a:spcPct val="100000"/>
-              </a:lnSpc>
-              <a:spcBef>
-                <a:spcPts val="320"/>
-              </a:spcBef>
-              <a:spcAft>
-                <a:spcPts val="0"/>
-              </a:spcAft>
+            <a:endParaRPr dirty="0"/>
+          </a:p>
+          <a:p>
+            <a:pPr indent="-298450">
               <a:buSzPts val="1100"/>
-              <a:buChar char="●"/>
             </a:pPr>
             <a:r>
-              <a:rPr lang="de" sz="1300" u="sng">
+              <a:rPr lang="de" sz="1300" u="sng" dirty="0">
                 <a:solidFill>
                   <a:schemeClr val="hlink"/>
                 </a:solidFill>
@@ -16007,11 +15844,129 @@
               </a:rPr>
               <a:t>https://www.digitalocean.com/community/tutorials/how-to-create-ssh-keys-with-openssh-on-macos-or-linux</a:t>
             </a:r>
-            <a:endParaRPr sz="1300"/>
+            <a:endParaRPr lang="de" sz="1400" dirty="0"/>
+          </a:p>
+          <a:p>
+            <a:pPr indent="-298450">
+              <a:buSzPts val="1100"/>
+            </a:pPr>
+            <a:r>
+              <a:rPr lang="de" sz="1400" dirty="0">
+                <a:solidFill>
+                  <a:schemeClr val="tx1"/>
+                </a:solidFill>
+              </a:rPr>
+              <a:t>Auf Linux und Windows Mittlerweile Identisch mit ssh-keygen (Ab Windows 10 Vorinstalliert)</a:t>
+            </a:r>
+          </a:p>
+          <a:p>
+            <a:pPr indent="-298450">
+              <a:buSzPts val="1100"/>
+            </a:pPr>
+            <a:r>
+              <a:rPr lang="de" sz="1400" dirty="0">
+                <a:solidFill>
+                  <a:schemeClr val="tx1"/>
+                </a:solidFill>
+              </a:rPr>
+              <a:t>Es folgt einmal ein Beispiel unter Windows 11 mit Powershell, aber exakt genauso unter Linux und Mac möglich</a:t>
+            </a:r>
           </a:p>
         </p:txBody>
       </p:sp>
     </p:spTree>
+  </p:cSld>
+  <p:clrMapOvr>
+    <a:masterClrMapping/>
+  </p:clrMapOvr>
+</p:sld>
+</file>
+
+<file path=ppt/slides/slide9.xml><?xml version="1.0" encoding="utf-8"?>
+<p:sld xmlns:a="http://schemas.openxmlformats.org/drawingml/2006/main" xmlns:r="http://schemas.openxmlformats.org/officeDocument/2006/relationships" xmlns:p="http://schemas.openxmlformats.org/presentationml/2006/main">
+  <p:cSld>
+    <p:spTree>
+      <p:nvGrpSpPr>
+        <p:cNvPr id="1" name=""/>
+        <p:cNvGrpSpPr/>
+        <p:nvPr/>
+      </p:nvGrpSpPr>
+      <p:grpSpPr>
+        <a:xfrm>
+          <a:off x="0" y="0"/>
+          <a:ext cx="0" cy="0"/>
+          <a:chOff x="0" y="0"/>
+          <a:chExt cx="0" cy="0"/>
+        </a:xfrm>
+      </p:grpSpPr>
+      <p:sp>
+        <p:nvSpPr>
+          <p:cNvPr id="2" name="Titel 1">
+            <a:extLst>
+              <a:ext uri="{FF2B5EF4-FFF2-40B4-BE49-F238E27FC236}">
+                <a16:creationId xmlns:a16="http://schemas.microsoft.com/office/drawing/2014/main" id="{C0C7D7AC-AB55-4978-F105-194884F294B0}"/>
+              </a:ext>
+            </a:extLst>
+          </p:cNvPr>
+          <p:cNvSpPr>
+            <a:spLocks noGrp="1"/>
+          </p:cNvSpPr>
+          <p:nvPr>
+            <p:ph type="title"/>
+          </p:nvPr>
+        </p:nvSpPr>
+        <p:spPr/>
+        <p:txBody>
+          <a:bodyPr/>
+          <a:lstStyle/>
+          <a:p>
+            <a:r>
+              <a:rPr lang="de" dirty="0"/>
+              <a:t>2.2.1 </a:t>
+            </a:r>
+            <a:r>
+              <a:rPr lang="de-DE" dirty="0"/>
+              <a:t>SSH Schlüsselerzeugen</a:t>
+            </a:r>
+          </a:p>
+        </p:txBody>
+      </p:sp>
+      <p:pic>
+        <p:nvPicPr>
+          <p:cNvPr id="5" name="Grafik 4">
+            <a:extLst>
+              <a:ext uri="{FF2B5EF4-FFF2-40B4-BE49-F238E27FC236}">
+                <a16:creationId xmlns:a16="http://schemas.microsoft.com/office/drawing/2014/main" id="{4D8D792A-9390-3518-50DC-313AB9265551}"/>
+              </a:ext>
+            </a:extLst>
+          </p:cNvPr>
+          <p:cNvPicPr>
+            <a:picLocks noChangeAspect="1"/>
+          </p:cNvPicPr>
+          <p:nvPr/>
+        </p:nvPicPr>
+        <p:blipFill>
+          <a:blip r:embed="rId2"/>
+          <a:stretch>
+            <a:fillRect/>
+          </a:stretch>
+        </p:blipFill>
+        <p:spPr>
+          <a:xfrm>
+            <a:off x="1515706" y="770102"/>
+            <a:ext cx="6544588" cy="3724795"/>
+          </a:xfrm>
+          <a:prstGeom prst="rect">
+            <a:avLst/>
+          </a:prstGeom>
+        </p:spPr>
+      </p:pic>
+    </p:spTree>
+    <p:extLst>
+      <p:ext uri="{BB962C8B-B14F-4D97-AF65-F5344CB8AC3E}">
+        <p14:creationId xmlns:p14="http://schemas.microsoft.com/office/powerpoint/2010/main" val="116044607"/>
+      </p:ext>
+    </p:extLst>
   </p:cSld>
   <p:clrMapOvr>
     <a:masterClrMapping/>

</xml_diff>

<commit_message>
Slides 00_Installation_introduction: JDK Installation, example mit winget für Windows und apt für ubuntu
</commit_message>
<xml_diff>
--- a/slides/00_installation_introduction.pptx
+++ b/slides/00_installation_introduction.pptx
@@ -1924,7 +1924,7 @@
         </p:nvSpPr>
         <p:spPr>
           <a:xfrm>
-            <a:off x="381300" y="685800"/>
+            <a:off x="381000" y="685800"/>
             <a:ext cx="6096000" cy="3429000"/>
           </a:xfrm>
           <a:custGeom>
@@ -15499,8 +15499,102 @@
                 <a:solidFill>
                   <a:schemeClr val="accent1"/>
                 </a:solidFill>
+                <a:hlinkClick r:id="rId3"/>
               </a:rPr>
               <a:t>https://learn.microsoft.com/de-de/java/openjdk/install</a:t>
+            </a:r>
+            <a:endParaRPr lang="de" sz="1300" u="sng" dirty="0">
+              <a:solidFill>
+                <a:schemeClr val="accent1"/>
+              </a:solidFill>
+            </a:endParaRPr>
+          </a:p>
+          <a:p>
+            <a:pPr marL="914400" lvl="1" indent="-323850" algn="l" rtl="0">
+              <a:lnSpc>
+                <a:spcPct val="100000"/>
+              </a:lnSpc>
+              <a:spcBef>
+                <a:spcPts val="0"/>
+              </a:spcBef>
+              <a:spcAft>
+                <a:spcPts val="0"/>
+              </a:spcAft>
+              <a:buSzPts val="1500"/>
+              <a:buChar char="-"/>
+            </a:pPr>
+            <a:r>
+              <a:rPr lang="de" sz="1300" dirty="0">
+                <a:solidFill>
+                  <a:schemeClr val="tx1"/>
+                </a:solidFill>
+              </a:rPr>
+              <a:t>Winget: „</a:t>
+            </a:r>
+            <a:r>
+              <a:rPr lang="de-DE" sz="1300" dirty="0" err="1">
+                <a:solidFill>
+                  <a:schemeClr val="tx1"/>
+                </a:solidFill>
+              </a:rPr>
+              <a:t>winget</a:t>
+            </a:r>
+            <a:r>
+              <a:rPr lang="de-DE" sz="1300" dirty="0">
+                <a:solidFill>
+                  <a:schemeClr val="tx1"/>
+                </a:solidFill>
+              </a:rPr>
+              <a:t> </a:t>
+            </a:r>
+            <a:r>
+              <a:rPr lang="de-DE" sz="1300" dirty="0" err="1">
+                <a:solidFill>
+                  <a:schemeClr val="tx1"/>
+                </a:solidFill>
+              </a:rPr>
+              <a:t>install</a:t>
+            </a:r>
+            <a:r>
+              <a:rPr lang="de-DE" sz="1300" dirty="0">
+                <a:solidFill>
+                  <a:schemeClr val="tx1"/>
+                </a:solidFill>
+              </a:rPr>
+              <a:t> -e --</a:t>
+            </a:r>
+            <a:r>
+              <a:rPr lang="de-DE" sz="1300" dirty="0" err="1">
+                <a:solidFill>
+                  <a:schemeClr val="tx1"/>
+                </a:solidFill>
+              </a:rPr>
+              <a:t>id</a:t>
+            </a:r>
+            <a:r>
+              <a:rPr lang="de-DE" sz="1300" dirty="0">
+                <a:solidFill>
+                  <a:schemeClr val="tx1"/>
+                </a:solidFill>
+              </a:rPr>
+              <a:t> Oracle.JDK.17“</a:t>
+            </a:r>
+          </a:p>
+          <a:p>
+            <a:pPr lvl="2" indent="-323850">
+              <a:spcBef>
+                <a:spcPts val="0"/>
+              </a:spcBef>
+              <a:buSzPts val="1500"/>
+              <a:buChar char="-"/>
+            </a:pPr>
+            <a:r>
+              <a:rPr lang="de-DE" sz="1300" dirty="0">
+                <a:solidFill>
+                  <a:schemeClr val="tx1"/>
+                </a:solidFill>
+              </a:rPr>
+              <a:t>Mit der Zahl am Ende, die Version</a:t>
             </a:r>
             <a:br>
               <a:rPr lang="de" sz="1300" dirty="0"/>
@@ -15550,8 +15644,63 @@
                 <a:solidFill>
                   <a:schemeClr val="accent1"/>
                 </a:solidFill>
+                <a:hlinkClick r:id="rId4"/>
               </a:rPr>
               <a:t>https://wiki.ubuntuusers.de/Java/Installation/OpenJDK/</a:t>
+            </a:r>
+            <a:endParaRPr lang="de" sz="1300" u="sng" dirty="0">
+              <a:solidFill>
+                <a:schemeClr val="accent1"/>
+              </a:solidFill>
+            </a:endParaRPr>
+          </a:p>
+          <a:p>
+            <a:pPr lvl="2" indent="-323850">
+              <a:spcBef>
+                <a:spcPts val="0"/>
+              </a:spcBef>
+              <a:buSzPts val="1500"/>
+              <a:buChar char="-"/>
+            </a:pPr>
+            <a:r>
+              <a:rPr lang="de-DE" sz="1300" dirty="0" err="1"/>
+              <a:t>Z.b.</a:t>
+            </a:r>
+            <a:r>
+              <a:rPr lang="de-DE" sz="1300" dirty="0"/>
+              <a:t>: Für </a:t>
+            </a:r>
+            <a:r>
+              <a:rPr lang="de-DE" sz="1300" dirty="0" err="1"/>
+              <a:t>Ubunutu</a:t>
+            </a:r>
+            <a:r>
+              <a:rPr lang="de-DE" sz="1300" dirty="0"/>
+              <a:t> „</a:t>
+            </a:r>
+            <a:r>
+              <a:rPr lang="de-DE" sz="1300" dirty="0" err="1"/>
+              <a:t>apt</a:t>
+            </a:r>
+            <a:r>
+              <a:rPr lang="de-DE" sz="1300" dirty="0"/>
+              <a:t> </a:t>
+            </a:r>
+            <a:r>
+              <a:rPr lang="de-DE" sz="1300" dirty="0" err="1"/>
+              <a:t>install</a:t>
+            </a:r>
+            <a:r>
+              <a:rPr lang="de-DE" sz="1300" dirty="0"/>
+              <a:t> </a:t>
+            </a:r>
+            <a:r>
+              <a:rPr lang="de-DE" sz="1300" dirty="0" err="1"/>
+              <a:t>default-jdk</a:t>
+            </a:r>
+            <a:r>
+              <a:rPr lang="de-DE" sz="1300" dirty="0"/>
+              <a:t>“</a:t>
             </a:r>
             <a:br>
               <a:rPr lang="de" sz="1300" dirty="0"/>

</xml_diff>